<commit_message>
Removed SCPCM from OpenSource Powerpoint Overview Modified Help to include "Contributors" and "Developers" Changed Help to distribution A
</commit_message>
<xml_diff>
--- a/GUI Documentation/OpenSourceOverview.pptx
+++ b/GUI Documentation/OpenSourceOverview.pptx
@@ -267,7 +267,7 @@
             <a:fld id="{47802B59-CA50-4283-8B53-B06FA28FE7F4}" type="datetimeFigureOut">
               <a:rPr lang="en-US" smtClean="0"/>
               <a:pPr/>
-              <a:t>8/15/2019</a:t>
+              <a:t>8/20/2019</a:t>
             </a:fld>
             <a:endParaRPr lang="en-US" dirty="0"/>
           </a:p>
@@ -4836,29 +4836,22 @@
       </p:grpSpPr>
       <p:pic>
         <p:nvPicPr>
-          <p:cNvPr id="5" name="Content Placeholder 4"/>
+          <p:cNvPr id="6" name="Picture 5"/>
           <p:cNvPicPr>
-            <a:picLocks noGrp="1" noChangeAspect="1"/>
+            <a:picLocks noChangeAspect="1"/>
           </p:cNvPicPr>
-          <p:nvPr>
-            <p:ph idx="1"/>
-          </p:nvPr>
+          <p:nvPr/>
         </p:nvPicPr>
-        <p:blipFill rotWithShape="1">
-          <a:blip r:embed="rId2" cstate="print">
-            <a:extLst>
-              <a:ext uri="{28A0092B-C50C-407E-A947-70E740481C1C}">
-                <a14:useLocalDpi xmlns:a14="http://schemas.microsoft.com/office/drawing/2010/main" val="0"/>
-              </a:ext>
-            </a:extLst>
-          </a:blip>
-          <a:srcRect/>
-          <a:stretch/>
+        <p:blipFill>
+          <a:blip r:embed="rId2"/>
+          <a:stretch>
+            <a:fillRect/>
+          </a:stretch>
         </p:blipFill>
         <p:spPr>
           <a:xfrm>
-            <a:off x="325567" y="1312427"/>
-            <a:ext cx="2815481" cy="4616101"/>
+            <a:off x="319061" y="1312427"/>
+            <a:ext cx="2816596" cy="4621169"/>
           </a:xfrm>
           <a:prstGeom prst="rect">
             <a:avLst/>
@@ -4897,7 +4890,7 @@
         <p:spPr>
           <a:xfrm>
             <a:off x="4170066" y="954594"/>
-            <a:ext cx="3969099" cy="5478423"/>
+            <a:ext cx="3969099" cy="4431983"/>
           </a:xfrm>
           <a:prstGeom prst="rect">
             <a:avLst/>
@@ -4998,37 +4991,9 @@
           <a:p>
             <a:r>
               <a:rPr lang="en-US" dirty="0" smtClean="0"/>
-              <a:t>SCPCM</a:t>
-            </a:r>
-          </a:p>
-          <a:p>
-            <a:pPr marL="285750" indent="-285750">
-              <a:buFont typeface="Arial" panose="020B0604020202020204" pitchFamily="34" charset="0"/>
-              <a:buChar char="•"/>
-            </a:pPr>
-            <a:r>
-              <a:rPr lang="en-US" sz="1600" dirty="0" smtClean="0"/>
-              <a:t>PCM properties +</a:t>
-            </a:r>
-          </a:p>
-          <a:p>
-            <a:pPr marL="285750" indent="-285750">
-              <a:buFont typeface="Arial" panose="020B0604020202020204" pitchFamily="34" charset="0"/>
-              <a:buChar char="•"/>
-            </a:pPr>
-            <a:r>
-              <a:rPr lang="en-US" sz="1600" dirty="0" smtClean="0"/>
-              <a:t>Nucleation temperature </a:t>
-            </a:r>
-          </a:p>
-          <a:p>
-            <a:endParaRPr lang="en-US" dirty="0"/>
-          </a:p>
-          <a:p>
-            <a:r>
-              <a:rPr lang="en-US" dirty="0" smtClean="0"/>
               <a:t>IBC</a:t>
             </a:r>
+            <a:endParaRPr lang="en-US" dirty="0" smtClean="0"/>
           </a:p>
           <a:p>
             <a:pPr marL="285750" indent="-285750">
@@ -5127,50 +5092,14 @@
       </p:cxnSp>
       <p:cxnSp>
         <p:nvCxnSpPr>
-          <p:cNvPr id="13" name="Straight Arrow Connector 12"/>
-          <p:cNvCxnSpPr/>
-          <p:nvPr/>
-        </p:nvCxnSpPr>
-        <p:spPr>
-          <a:xfrm flipV="1">
-            <a:off x="2220272" y="4744278"/>
-            <a:ext cx="2023336" cy="789975"/>
-          </a:xfrm>
-          <a:prstGeom prst="straightConnector1">
-            <a:avLst/>
-          </a:prstGeom>
-          <a:ln w="63500">
-            <a:solidFill>
-              <a:srgbClr val="92D050"/>
-            </a:solidFill>
-            <a:tailEnd type="triangle"/>
-          </a:ln>
-        </p:spPr>
-        <p:style>
-          <a:lnRef idx="1">
-            <a:schemeClr val="accent1"/>
-          </a:lnRef>
-          <a:fillRef idx="0">
-            <a:schemeClr val="accent1"/>
-          </a:fillRef>
-          <a:effectRef idx="0">
-            <a:schemeClr val="accent1"/>
-          </a:effectRef>
-          <a:fontRef idx="minor">
-            <a:schemeClr val="tx1"/>
-          </a:fontRef>
-        </p:style>
-      </p:cxnSp>
-      <p:cxnSp>
-        <p:nvCxnSpPr>
           <p:cNvPr id="18" name="Straight Arrow Connector 17"/>
           <p:cNvCxnSpPr/>
           <p:nvPr/>
         </p:nvCxnSpPr>
         <p:spPr>
           <a:xfrm flipV="1">
-            <a:off x="2013447" y="5711687"/>
-            <a:ext cx="2216909" cy="26382"/>
+            <a:off x="2040959" y="4684222"/>
+            <a:ext cx="2189397" cy="875899"/>
           </a:xfrm>
           <a:prstGeom prst="straightConnector1">
             <a:avLst/>
@@ -27124,23 +27053,6 @@
 </file>
 
 <file path=customXml/item1.xml><?xml version="1.0" encoding="utf-8"?>
-<?mso-contentType ?>
-<FormTemplates xmlns="http://schemas.microsoft.com/sharepoint/v3/contenttype/forms">
-  <Display>DocumentLibraryForm</Display>
-  <Edit>DocumentLibraryForm</Edit>
-  <New>DocumentLibraryForm</New>
-</FormTemplates>
-</file>
-
-<file path=customXml/item2.xml><?xml version="1.0" encoding="utf-8"?>
-<p:properties xmlns:p="http://schemas.microsoft.com/office/2006/metadata/properties" xmlns:xsi="http://www.w3.org/2001/XMLSchema-instance" xmlns:pc="http://schemas.microsoft.com/office/infopath/2007/PartnerControls">
-  <documentManagement>
-    <Document_x0020_Type xmlns="7dcc513f-4b87-4db4-9bd2-1b8c8e94889f">Sample</Document_x0020_Type>
-  </documentManagement>
-</p:properties>
-</file>
-
-<file path=customXml/item3.xml><?xml version="1.0" encoding="utf-8"?>
 <ct:contentTypeSchema xmlns:ct="http://schemas.microsoft.com/office/2006/metadata/contentType" xmlns:ma="http://schemas.microsoft.com/office/2006/metadata/properties/metaAttributes" ct:_="" ma:_="" ma:contentTypeName="Document" ma:contentTypeID="0x010100AB8568DBF36F4042AA4E09865AE7BACA" ma:contentTypeVersion="2" ma:contentTypeDescription="Create a new document." ma:contentTypeScope="" ma:versionID="9cf4fadfbf35e75f358984352b4a0bf7">
   <xsd:schema xmlns:xsd="http://www.w3.org/2001/XMLSchema" xmlns:xs="http://www.w3.org/2001/XMLSchema" xmlns:p="http://schemas.microsoft.com/office/2006/metadata/properties" xmlns:ns2="7dcc513f-4b87-4db4-9bd2-1b8c8e94889f" targetNamespace="http://schemas.microsoft.com/office/2006/metadata/properties" ma:root="true" ma:fieldsID="28f554992c4c7bc4874674b2d99fc895" ns2:_="">
     <xsd:import namespace="7dcc513f-4b87-4db4-9bd2-1b8c8e94889f"/>
@@ -27269,10 +27181,37 @@
 </ct:contentTypeSchema>
 </file>
 
+<file path=customXml/item2.xml><?xml version="1.0" encoding="utf-8"?>
+<p:properties xmlns:p="http://schemas.microsoft.com/office/2006/metadata/properties" xmlns:xsi="http://www.w3.org/2001/XMLSchema-instance" xmlns:pc="http://schemas.microsoft.com/office/infopath/2007/PartnerControls">
+  <documentManagement>
+    <Document_x0020_Type xmlns="7dcc513f-4b87-4db4-9bd2-1b8c8e94889f">Sample</Document_x0020_Type>
+  </documentManagement>
+</p:properties>
+</file>
+
+<file path=customXml/item3.xml><?xml version="1.0" encoding="utf-8"?>
+<?mso-contentType ?>
+<FormTemplates xmlns="http://schemas.microsoft.com/sharepoint/v3/contenttype/forms">
+  <Display>DocumentLibraryForm</Display>
+  <Edit>DocumentLibraryForm</Edit>
+  <New>DocumentLibraryForm</New>
+</FormTemplates>
+</file>
+
 <file path=customXml/itemProps1.xml><?xml version="1.0" encoding="utf-8"?>
-<ds:datastoreItem xmlns:ds="http://schemas.openxmlformats.org/officeDocument/2006/customXml" ds:itemID="{1A3DBC3F-1BD6-457B-823D-FD749E2AD09E}">
+<ds:datastoreItem xmlns:ds="http://schemas.openxmlformats.org/officeDocument/2006/customXml" ds:itemID="{DF70CC83-22DC-4870-9550-3CBB7A88BBD0}">
   <ds:schemaRefs>
-    <ds:schemaRef ds:uri="http://schemas.microsoft.com/sharepoint/v3/contenttype/forms"/>
+    <ds:schemaRef ds:uri="http://schemas.microsoft.com/office/2006/metadata/contentType"/>
+    <ds:schemaRef ds:uri="http://schemas.microsoft.com/office/2006/metadata/properties/metaAttributes"/>
+    <ds:schemaRef ds:uri="http://www.w3.org/2001/XMLSchema"/>
+    <ds:schemaRef ds:uri="http://schemas.microsoft.com/office/2006/metadata/properties"/>
+    <ds:schemaRef ds:uri="7dcc513f-4b87-4db4-9bd2-1b8c8e94889f"/>
+    <ds:schemaRef ds:uri="http://schemas.microsoft.com/office/2006/documentManagement/types"/>
+    <ds:schemaRef ds:uri="http://schemas.microsoft.com/office/infopath/2007/PartnerControls"/>
+    <ds:schemaRef ds:uri="http://schemas.openxmlformats.org/package/2006/metadata/core-properties"/>
+    <ds:schemaRef ds:uri="http://purl.org/dc/elements/1.1/"/>
+    <ds:schemaRef ds:uri="http://purl.org/dc/terms/"/>
+    <ds:schemaRef ds:uri="http://schemas.microsoft.com/internal/obd"/>
   </ds:schemaRefs>
 </ds:datastoreItem>
 </file>
@@ -27294,19 +27233,9 @@
 </file>
 
 <file path=customXml/itemProps3.xml><?xml version="1.0" encoding="utf-8"?>
-<ds:datastoreItem xmlns:ds="http://schemas.openxmlformats.org/officeDocument/2006/customXml" ds:itemID="{DF70CC83-22DC-4870-9550-3CBB7A88BBD0}">
+<ds:datastoreItem xmlns:ds="http://schemas.openxmlformats.org/officeDocument/2006/customXml" ds:itemID="{1A3DBC3F-1BD6-457B-823D-FD749E2AD09E}">
   <ds:schemaRefs>
-    <ds:schemaRef ds:uri="http://schemas.microsoft.com/office/2006/metadata/contentType"/>
-    <ds:schemaRef ds:uri="http://schemas.microsoft.com/office/2006/metadata/properties/metaAttributes"/>
-    <ds:schemaRef ds:uri="http://www.w3.org/2001/XMLSchema"/>
-    <ds:schemaRef ds:uri="http://schemas.microsoft.com/office/2006/metadata/properties"/>
-    <ds:schemaRef ds:uri="7dcc513f-4b87-4db4-9bd2-1b8c8e94889f"/>
-    <ds:schemaRef ds:uri="http://schemas.microsoft.com/office/2006/documentManagement/types"/>
-    <ds:schemaRef ds:uri="http://schemas.microsoft.com/office/infopath/2007/PartnerControls"/>
-    <ds:schemaRef ds:uri="http://schemas.openxmlformats.org/package/2006/metadata/core-properties"/>
-    <ds:schemaRef ds:uri="http://purl.org/dc/elements/1.1/"/>
-    <ds:schemaRef ds:uri="http://purl.org/dc/terms/"/>
-    <ds:schemaRef ds:uri="http://schemas.microsoft.com/internal/obd"/>
+    <ds:schemaRef ds:uri="http://schemas.microsoft.com/sharepoint/v3/contenttype/forms"/>
   </ds:schemaRefs>
 </ds:datastoreItem>
 </file>
</xml_diff>

<commit_message>
Added Distr statement to PPT
</commit_message>
<xml_diff>
--- a/GUI Documentation/OpenSourceOverview.pptx
+++ b/GUI Documentation/OpenSourceOverview.pptx
@@ -267,7 +267,7 @@
             <a:fld id="{47802B59-CA50-4283-8B53-B06FA28FE7F4}" type="datetimeFigureOut">
               <a:rPr lang="en-US" smtClean="0"/>
               <a:pPr/>
-              <a:t>8/20/2019</a:t>
+              <a:t>9/11/2019</a:t>
             </a:fld>
             <a:endParaRPr lang="en-US" dirty="0"/>
           </a:p>
@@ -3273,7 +3273,7 @@
                 <a:latin typeface="Arial Bold" panose="020B0704020202020204" pitchFamily="34" charset="0"/>
                 <a:cs typeface="Arial Bold" panose="020B0704020202020204" pitchFamily="34" charset="0"/>
               </a:rPr>
-              <a:t>UNCLASSIFIED</a:t>
+              <a:t>Public Dissemination/Approved for public release.</a:t>
             </a:r>
             <a:endParaRPr lang="en-US" sz="800" dirty="0">
               <a:solidFill>
@@ -3326,7 +3326,7 @@
                 <a:latin typeface="Arial Bold" panose="020B0704020202020204" pitchFamily="34" charset="0"/>
                 <a:cs typeface="Arial Bold" panose="020B0704020202020204" pitchFamily="34" charset="0"/>
               </a:rPr>
-              <a:t>UNCLASSIFIED</a:t>
+              <a:t>Public Dissemination/Approved for public release.</a:t>
             </a:r>
             <a:endParaRPr lang="en-US" sz="800" dirty="0">
               <a:solidFill>
@@ -3930,7 +3930,27 @@
           <a:bodyPr/>
           <a:lstStyle/>
           <a:p>
-            <a:endParaRPr lang="en-US"/>
+            <a:r>
+              <a:rPr lang="en-US" b="1" dirty="0" smtClean="0"/>
+              <a:t>DISTRIBUTION STATEMENT A: </a:t>
+            </a:r>
+            <a:r>
+              <a:rPr lang="en-US" sz="700" b="1" dirty="0" smtClean="0">
+                <a:latin typeface="Arial Bold" panose="020B0704020202020204" pitchFamily="34" charset="0"/>
+                <a:cs typeface="Arial Bold" panose="020B0704020202020204" pitchFamily="34" charset="0"/>
+              </a:rPr>
+              <a:t>Approved </a:t>
+            </a:r>
+            <a:r>
+              <a:rPr lang="en-US" sz="700" b="1" dirty="0">
+                <a:latin typeface="Arial Bold" panose="020B0704020202020204" pitchFamily="34" charset="0"/>
+                <a:cs typeface="Arial Bold" panose="020B0704020202020204" pitchFamily="34" charset="0"/>
+              </a:rPr>
+              <a:t>for public release.</a:t>
+            </a:r>
+          </a:p>
+          <a:p>
+            <a:endParaRPr lang="en-US" dirty="0"/>
           </a:p>
         </p:txBody>
       </p:sp>
@@ -4993,7 +5013,6 @@
               <a:rPr lang="en-US" dirty="0" smtClean="0"/>
               <a:t>IBC</a:t>
             </a:r>
-            <a:endParaRPr lang="en-US" dirty="0" smtClean="0"/>
           </a:p>
           <a:p>
             <a:pPr marL="285750" indent="-285750">
@@ -27053,6 +27072,14 @@
 </file>
 
 <file path=customXml/item1.xml><?xml version="1.0" encoding="utf-8"?>
+<p:properties xmlns:p="http://schemas.microsoft.com/office/2006/metadata/properties" xmlns:xsi="http://www.w3.org/2001/XMLSchema-instance" xmlns:pc="http://schemas.microsoft.com/office/infopath/2007/PartnerControls">
+  <documentManagement>
+    <Document_x0020_Type xmlns="7dcc513f-4b87-4db4-9bd2-1b8c8e94889f">Sample</Document_x0020_Type>
+  </documentManagement>
+</p:properties>
+</file>
+
+<file path=customXml/item2.xml><?xml version="1.0" encoding="utf-8"?>
 <ct:contentTypeSchema xmlns:ct="http://schemas.microsoft.com/office/2006/metadata/contentType" xmlns:ma="http://schemas.microsoft.com/office/2006/metadata/properties/metaAttributes" ct:_="" ma:_="" ma:contentTypeName="Document" ma:contentTypeID="0x010100AB8568DBF36F4042AA4E09865AE7BACA" ma:contentTypeVersion="2" ma:contentTypeDescription="Create a new document." ma:contentTypeScope="" ma:versionID="9cf4fadfbf35e75f358984352b4a0bf7">
   <xsd:schema xmlns:xsd="http://www.w3.org/2001/XMLSchema" xmlns:xs="http://www.w3.org/2001/XMLSchema" xmlns:p="http://schemas.microsoft.com/office/2006/metadata/properties" xmlns:ns2="7dcc513f-4b87-4db4-9bd2-1b8c8e94889f" targetNamespace="http://schemas.microsoft.com/office/2006/metadata/properties" ma:root="true" ma:fieldsID="28f554992c4c7bc4874674b2d99fc895" ns2:_="">
     <xsd:import namespace="7dcc513f-4b87-4db4-9bd2-1b8c8e94889f"/>
@@ -27181,14 +27208,6 @@
 </ct:contentTypeSchema>
 </file>
 
-<file path=customXml/item2.xml><?xml version="1.0" encoding="utf-8"?>
-<p:properties xmlns:p="http://schemas.microsoft.com/office/2006/metadata/properties" xmlns:xsi="http://www.w3.org/2001/XMLSchema-instance" xmlns:pc="http://schemas.microsoft.com/office/infopath/2007/PartnerControls">
-  <documentManagement>
-    <Document_x0020_Type xmlns="7dcc513f-4b87-4db4-9bd2-1b8c8e94889f">Sample</Document_x0020_Type>
-  </documentManagement>
-</p:properties>
-</file>
-
 <file path=customXml/item3.xml><?xml version="1.0" encoding="utf-8"?>
 <?mso-contentType ?>
 <FormTemplates xmlns="http://schemas.microsoft.com/sharepoint/v3/contenttype/forms">
@@ -27199,6 +27218,22 @@
 </file>
 
 <file path=customXml/itemProps1.xml><?xml version="1.0" encoding="utf-8"?>
+<ds:datastoreItem xmlns:ds="http://schemas.openxmlformats.org/officeDocument/2006/customXml" ds:itemID="{D1C3164B-E357-4C61-9748-6D3606BFACD6}">
+  <ds:schemaRefs>
+    <ds:schemaRef ds:uri="http://purl.org/dc/terms/"/>
+    <ds:schemaRef ds:uri="http://schemas.openxmlformats.org/package/2006/metadata/core-properties"/>
+    <ds:schemaRef ds:uri="7dcc513f-4b87-4db4-9bd2-1b8c8e94889f"/>
+    <ds:schemaRef ds:uri="http://purl.org/dc/dcmitype/"/>
+    <ds:schemaRef ds:uri="http://schemas.microsoft.com/office/infopath/2007/PartnerControls"/>
+    <ds:schemaRef ds:uri="http://schemas.microsoft.com/office/2006/documentManagement/types"/>
+    <ds:schemaRef ds:uri="http://purl.org/dc/elements/1.1/"/>
+    <ds:schemaRef ds:uri="http://schemas.microsoft.com/office/2006/metadata/properties"/>
+    <ds:schemaRef ds:uri="http://www.w3.org/XML/1998/namespace"/>
+  </ds:schemaRefs>
+</ds:datastoreItem>
+</file>
+
+<file path=customXml/itemProps2.xml><?xml version="1.0" encoding="utf-8"?>
 <ds:datastoreItem xmlns:ds="http://schemas.openxmlformats.org/officeDocument/2006/customXml" ds:itemID="{DF70CC83-22DC-4870-9550-3CBB7A88BBD0}">
   <ds:schemaRefs>
     <ds:schemaRef ds:uri="http://schemas.microsoft.com/office/2006/metadata/contentType"/>
@@ -27216,22 +27251,6 @@
 </ds:datastoreItem>
 </file>
 
-<file path=customXml/itemProps2.xml><?xml version="1.0" encoding="utf-8"?>
-<ds:datastoreItem xmlns:ds="http://schemas.openxmlformats.org/officeDocument/2006/customXml" ds:itemID="{D1C3164B-E357-4C61-9748-6D3606BFACD6}">
-  <ds:schemaRefs>
-    <ds:schemaRef ds:uri="http://purl.org/dc/terms/"/>
-    <ds:schemaRef ds:uri="http://schemas.openxmlformats.org/package/2006/metadata/core-properties"/>
-    <ds:schemaRef ds:uri="7dcc513f-4b87-4db4-9bd2-1b8c8e94889f"/>
-    <ds:schemaRef ds:uri="http://purl.org/dc/dcmitype/"/>
-    <ds:schemaRef ds:uri="http://schemas.microsoft.com/office/infopath/2007/PartnerControls"/>
-    <ds:schemaRef ds:uri="http://schemas.microsoft.com/office/2006/documentManagement/types"/>
-    <ds:schemaRef ds:uri="http://purl.org/dc/elements/1.1/"/>
-    <ds:schemaRef ds:uri="http://schemas.microsoft.com/office/2006/metadata/properties"/>
-    <ds:schemaRef ds:uri="http://www.w3.org/XML/1998/namespace"/>
-  </ds:schemaRefs>
-</ds:datastoreItem>
-</file>
-
 <file path=customXml/itemProps3.xml><?xml version="1.0" encoding="utf-8"?>
 <ds:datastoreItem xmlns:ds="http://schemas.openxmlformats.org/officeDocument/2006/customXml" ds:itemID="{1A3DBC3F-1BD6-457B-823D-FD749E2AD09E}">
   <ds:schemaRefs>

</xml_diff>

<commit_message>
File structure cleaned up.
</commit_message>
<xml_diff>
--- a/GUI Documentation/OpenSourceOverview.pptx
+++ b/GUI Documentation/OpenSourceOverview.pptx
@@ -267,7 +267,7 @@
             <a:fld id="{47802B59-CA50-4283-8B53-B06FA28FE7F4}" type="datetimeFigureOut">
               <a:rPr lang="en-US" smtClean="0"/>
               <a:pPr/>
-              <a:t>8/15/2019</a:t>
+              <a:t>9/11/2019</a:t>
             </a:fld>
             <a:endParaRPr lang="en-US" dirty="0"/>
           </a:p>
@@ -3273,7 +3273,7 @@
                 <a:latin typeface="Arial Bold" panose="020B0704020202020204" pitchFamily="34" charset="0"/>
                 <a:cs typeface="Arial Bold" panose="020B0704020202020204" pitchFamily="34" charset="0"/>
               </a:rPr>
-              <a:t>UNCLASSIFIED</a:t>
+              <a:t>Public Dissemination/Approved for public release.</a:t>
             </a:r>
             <a:endParaRPr lang="en-US" sz="800" dirty="0">
               <a:solidFill>
@@ -3326,7 +3326,7 @@
                 <a:latin typeface="Arial Bold" panose="020B0704020202020204" pitchFamily="34" charset="0"/>
                 <a:cs typeface="Arial Bold" panose="020B0704020202020204" pitchFamily="34" charset="0"/>
               </a:rPr>
-              <a:t>UNCLASSIFIED</a:t>
+              <a:t>Public Dissemination/Approved for public release.</a:t>
             </a:r>
             <a:endParaRPr lang="en-US" sz="800" dirty="0">
               <a:solidFill>
@@ -3930,7 +3930,27 @@
           <a:bodyPr/>
           <a:lstStyle/>
           <a:p>
-            <a:endParaRPr lang="en-US"/>
+            <a:r>
+              <a:rPr lang="en-US" b="1" dirty="0" smtClean="0"/>
+              <a:t>DISTRIBUTION STATEMENT A: </a:t>
+            </a:r>
+            <a:r>
+              <a:rPr lang="en-US" sz="700" b="1" dirty="0" smtClean="0">
+                <a:latin typeface="Arial Bold" panose="020B0704020202020204" pitchFamily="34" charset="0"/>
+                <a:cs typeface="Arial Bold" panose="020B0704020202020204" pitchFamily="34" charset="0"/>
+              </a:rPr>
+              <a:t>Approved </a:t>
+            </a:r>
+            <a:r>
+              <a:rPr lang="en-US" sz="700" b="1" dirty="0">
+                <a:latin typeface="Arial Bold" panose="020B0704020202020204" pitchFamily="34" charset="0"/>
+                <a:cs typeface="Arial Bold" panose="020B0704020202020204" pitchFamily="34" charset="0"/>
+              </a:rPr>
+              <a:t>for public release.</a:t>
+            </a:r>
+          </a:p>
+          <a:p>
+            <a:endParaRPr lang="en-US" dirty="0"/>
           </a:p>
         </p:txBody>
       </p:sp>
@@ -4836,29 +4856,22 @@
       </p:grpSpPr>
       <p:pic>
         <p:nvPicPr>
-          <p:cNvPr id="5" name="Content Placeholder 4"/>
+          <p:cNvPr id="6" name="Picture 5"/>
           <p:cNvPicPr>
-            <a:picLocks noGrp="1" noChangeAspect="1"/>
+            <a:picLocks noChangeAspect="1"/>
           </p:cNvPicPr>
-          <p:nvPr>
-            <p:ph idx="1"/>
-          </p:nvPr>
+          <p:nvPr/>
         </p:nvPicPr>
-        <p:blipFill rotWithShape="1">
-          <a:blip r:embed="rId2" cstate="print">
-            <a:extLst>
-              <a:ext uri="{28A0092B-C50C-407E-A947-70E740481C1C}">
-                <a14:useLocalDpi xmlns:a14="http://schemas.microsoft.com/office/drawing/2010/main" val="0"/>
-              </a:ext>
-            </a:extLst>
-          </a:blip>
-          <a:srcRect/>
-          <a:stretch/>
+        <p:blipFill>
+          <a:blip r:embed="rId2"/>
+          <a:stretch>
+            <a:fillRect/>
+          </a:stretch>
         </p:blipFill>
         <p:spPr>
           <a:xfrm>
-            <a:off x="325567" y="1312427"/>
-            <a:ext cx="2815481" cy="4616101"/>
+            <a:off x="319061" y="1312427"/>
+            <a:ext cx="2816596" cy="4621169"/>
           </a:xfrm>
           <a:prstGeom prst="rect">
             <a:avLst/>
@@ -4897,7 +4910,7 @@
         <p:spPr>
           <a:xfrm>
             <a:off x="4170066" y="954594"/>
-            <a:ext cx="3969099" cy="5478423"/>
+            <a:ext cx="3969099" cy="4431983"/>
           </a:xfrm>
           <a:prstGeom prst="rect">
             <a:avLst/>
@@ -4994,35 +5007,6 @@
           </a:p>
           <a:p>
             <a:endParaRPr lang="en-US" dirty="0" smtClean="0"/>
-          </a:p>
-          <a:p>
-            <a:r>
-              <a:rPr lang="en-US" dirty="0" smtClean="0"/>
-              <a:t>SCPCM</a:t>
-            </a:r>
-          </a:p>
-          <a:p>
-            <a:pPr marL="285750" indent="-285750">
-              <a:buFont typeface="Arial" panose="020B0604020202020204" pitchFamily="34" charset="0"/>
-              <a:buChar char="•"/>
-            </a:pPr>
-            <a:r>
-              <a:rPr lang="en-US" sz="1600" dirty="0" smtClean="0"/>
-              <a:t>PCM properties +</a:t>
-            </a:r>
-          </a:p>
-          <a:p>
-            <a:pPr marL="285750" indent="-285750">
-              <a:buFont typeface="Arial" panose="020B0604020202020204" pitchFamily="34" charset="0"/>
-              <a:buChar char="•"/>
-            </a:pPr>
-            <a:r>
-              <a:rPr lang="en-US" sz="1600" dirty="0" smtClean="0"/>
-              <a:t>Nucleation temperature </a:t>
-            </a:r>
-          </a:p>
-          <a:p>
-            <a:endParaRPr lang="en-US" dirty="0"/>
           </a:p>
           <a:p>
             <a:r>
@@ -5127,50 +5111,14 @@
       </p:cxnSp>
       <p:cxnSp>
         <p:nvCxnSpPr>
-          <p:cNvPr id="13" name="Straight Arrow Connector 12"/>
-          <p:cNvCxnSpPr/>
-          <p:nvPr/>
-        </p:nvCxnSpPr>
-        <p:spPr>
-          <a:xfrm flipV="1">
-            <a:off x="2220272" y="4744278"/>
-            <a:ext cx="2023336" cy="789975"/>
-          </a:xfrm>
-          <a:prstGeom prst="straightConnector1">
-            <a:avLst/>
-          </a:prstGeom>
-          <a:ln w="63500">
-            <a:solidFill>
-              <a:srgbClr val="92D050"/>
-            </a:solidFill>
-            <a:tailEnd type="triangle"/>
-          </a:ln>
-        </p:spPr>
-        <p:style>
-          <a:lnRef idx="1">
-            <a:schemeClr val="accent1"/>
-          </a:lnRef>
-          <a:fillRef idx="0">
-            <a:schemeClr val="accent1"/>
-          </a:fillRef>
-          <a:effectRef idx="0">
-            <a:schemeClr val="accent1"/>
-          </a:effectRef>
-          <a:fontRef idx="minor">
-            <a:schemeClr val="tx1"/>
-          </a:fontRef>
-        </p:style>
-      </p:cxnSp>
-      <p:cxnSp>
-        <p:nvCxnSpPr>
           <p:cNvPr id="18" name="Straight Arrow Connector 17"/>
           <p:cNvCxnSpPr/>
           <p:nvPr/>
         </p:nvCxnSpPr>
         <p:spPr>
           <a:xfrm flipV="1">
-            <a:off x="2013447" y="5711687"/>
-            <a:ext cx="2216909" cy="26382"/>
+            <a:off x="2040959" y="4684222"/>
+            <a:ext cx="2189397" cy="875899"/>
           </a:xfrm>
           <a:prstGeom prst="straightConnector1">
             <a:avLst/>
@@ -27124,15 +27072,6 @@
 </file>
 
 <file path=customXml/item1.xml><?xml version="1.0" encoding="utf-8"?>
-<?mso-contentType ?>
-<FormTemplates xmlns="http://schemas.microsoft.com/sharepoint/v3/contenttype/forms">
-  <Display>DocumentLibraryForm</Display>
-  <Edit>DocumentLibraryForm</Edit>
-  <New>DocumentLibraryForm</New>
-</FormTemplates>
-</file>
-
-<file path=customXml/item2.xml><?xml version="1.0" encoding="utf-8"?>
 <p:properties xmlns:p="http://schemas.microsoft.com/office/2006/metadata/properties" xmlns:xsi="http://www.w3.org/2001/XMLSchema-instance" xmlns:pc="http://schemas.microsoft.com/office/infopath/2007/PartnerControls">
   <documentManagement>
     <Document_x0020_Type xmlns="7dcc513f-4b87-4db4-9bd2-1b8c8e94889f">Sample</Document_x0020_Type>
@@ -27140,7 +27079,7 @@
 </p:properties>
 </file>
 
-<file path=customXml/item3.xml><?xml version="1.0" encoding="utf-8"?>
+<file path=customXml/item2.xml><?xml version="1.0" encoding="utf-8"?>
 <ct:contentTypeSchema xmlns:ct="http://schemas.microsoft.com/office/2006/metadata/contentType" xmlns:ma="http://schemas.microsoft.com/office/2006/metadata/properties/metaAttributes" ct:_="" ma:_="" ma:contentTypeName="Document" ma:contentTypeID="0x010100AB8568DBF36F4042AA4E09865AE7BACA" ma:contentTypeVersion="2" ma:contentTypeDescription="Create a new document." ma:contentTypeScope="" ma:versionID="9cf4fadfbf35e75f358984352b4a0bf7">
   <xsd:schema xmlns:xsd="http://www.w3.org/2001/XMLSchema" xmlns:xs="http://www.w3.org/2001/XMLSchema" xmlns:p="http://schemas.microsoft.com/office/2006/metadata/properties" xmlns:ns2="7dcc513f-4b87-4db4-9bd2-1b8c8e94889f" targetNamespace="http://schemas.microsoft.com/office/2006/metadata/properties" ma:root="true" ma:fieldsID="28f554992c4c7bc4874674b2d99fc895" ns2:_="">
     <xsd:import namespace="7dcc513f-4b87-4db4-9bd2-1b8c8e94889f"/>
@@ -27269,15 +27208,16 @@
 </ct:contentTypeSchema>
 </file>
 
-<file path=customXml/itemProps1.xml><?xml version="1.0" encoding="utf-8"?>
-<ds:datastoreItem xmlns:ds="http://schemas.openxmlformats.org/officeDocument/2006/customXml" ds:itemID="{1A3DBC3F-1BD6-457B-823D-FD749E2AD09E}">
-  <ds:schemaRefs>
-    <ds:schemaRef ds:uri="http://schemas.microsoft.com/sharepoint/v3/contenttype/forms"/>
-  </ds:schemaRefs>
-</ds:datastoreItem>
+<file path=customXml/item3.xml><?xml version="1.0" encoding="utf-8"?>
+<?mso-contentType ?>
+<FormTemplates xmlns="http://schemas.microsoft.com/sharepoint/v3/contenttype/forms">
+  <Display>DocumentLibraryForm</Display>
+  <Edit>DocumentLibraryForm</Edit>
+  <New>DocumentLibraryForm</New>
+</FormTemplates>
 </file>
 
-<file path=customXml/itemProps2.xml><?xml version="1.0" encoding="utf-8"?>
+<file path=customXml/itemProps1.xml><?xml version="1.0" encoding="utf-8"?>
 <ds:datastoreItem xmlns:ds="http://schemas.openxmlformats.org/officeDocument/2006/customXml" ds:itemID="{D1C3164B-E357-4C61-9748-6D3606BFACD6}">
   <ds:schemaRefs>
     <ds:schemaRef ds:uri="http://purl.org/dc/terms/"/>
@@ -27293,7 +27233,7 @@
 </ds:datastoreItem>
 </file>
 
-<file path=customXml/itemProps3.xml><?xml version="1.0" encoding="utf-8"?>
+<file path=customXml/itemProps2.xml><?xml version="1.0" encoding="utf-8"?>
 <ds:datastoreItem xmlns:ds="http://schemas.openxmlformats.org/officeDocument/2006/customXml" ds:itemID="{DF70CC83-22DC-4870-9550-3CBB7A88BBD0}">
   <ds:schemaRefs>
     <ds:schemaRef ds:uri="http://schemas.microsoft.com/office/2006/metadata/contentType"/>
@@ -27309,4 +27249,12 @@
     <ds:schemaRef ds:uri="http://schemas.microsoft.com/internal/obd"/>
   </ds:schemaRefs>
 </ds:datastoreItem>
+</file>
+
+<file path=customXml/itemProps3.xml><?xml version="1.0" encoding="utf-8"?>
+<ds:datastoreItem xmlns:ds="http://schemas.openxmlformats.org/officeDocument/2006/customXml" ds:itemID="{1A3DBC3F-1BD6-457B-823D-FD749E2AD09E}">
+  <ds:schemaRefs>
+    <ds:schemaRef ds:uri="http://schemas.microsoft.com/sharepoint/v3/contenttype/forms"/>
+  </ds:schemaRefs>
+</ds:datastoreItem>
 </file>
</xml_diff>